<commit_message>
reorg for final analysis
</commit_message>
<xml_diff>
--- a/docs/HER2_project2.pptx
+++ b/docs/HER2_project2.pptx
@@ -120,6 +120,11 @@
       </a:defRPr>
     </a:lvl9pPr>
   </p:defaultTextStyle>
+  <p:extLst>
+    <p:ext uri="{EFAFB233-063F-42B5-8137-9DF3F51BA10A}">
+      <p15:sldGuideLst xmlns:p15="http://schemas.microsoft.com/office/powerpoint/2012/main"/>
+    </p:ext>
+  </p:extLst>
 </p:presentation>
 </file>
 
@@ -270,7 +275,7 @@
           <a:p>
             <a:fld id="{FF84B8EE-2D36-44C5-957C-6F2F1F0AC147}" type="datetimeFigureOut">
               <a:rPr lang="en-US" smtClean="0"/>
-              <a:t>4/25/2021</a:t>
+              <a:t>6/9/2021</a:t>
             </a:fld>
             <a:endParaRPr lang="en-US"/>
           </a:p>
@@ -468,7 +473,7 @@
           <a:p>
             <a:fld id="{FF84B8EE-2D36-44C5-957C-6F2F1F0AC147}" type="datetimeFigureOut">
               <a:rPr lang="en-US" smtClean="0"/>
-              <a:t>4/25/2021</a:t>
+              <a:t>6/9/2021</a:t>
             </a:fld>
             <a:endParaRPr lang="en-US"/>
           </a:p>
@@ -676,7 +681,7 @@
           <a:p>
             <a:fld id="{FF84B8EE-2D36-44C5-957C-6F2F1F0AC147}" type="datetimeFigureOut">
               <a:rPr lang="en-US" smtClean="0"/>
-              <a:t>4/25/2021</a:t>
+              <a:t>6/9/2021</a:t>
             </a:fld>
             <a:endParaRPr lang="en-US"/>
           </a:p>
@@ -874,7 +879,7 @@
           <a:p>
             <a:fld id="{FF84B8EE-2D36-44C5-957C-6F2F1F0AC147}" type="datetimeFigureOut">
               <a:rPr lang="en-US" smtClean="0"/>
-              <a:t>4/25/2021</a:t>
+              <a:t>6/9/2021</a:t>
             </a:fld>
             <a:endParaRPr lang="en-US"/>
           </a:p>
@@ -1149,7 +1154,7 @@
           <a:p>
             <a:fld id="{FF84B8EE-2D36-44C5-957C-6F2F1F0AC147}" type="datetimeFigureOut">
               <a:rPr lang="en-US" smtClean="0"/>
-              <a:t>4/25/2021</a:t>
+              <a:t>6/9/2021</a:t>
             </a:fld>
             <a:endParaRPr lang="en-US"/>
           </a:p>
@@ -1414,7 +1419,7 @@
           <a:p>
             <a:fld id="{FF84B8EE-2D36-44C5-957C-6F2F1F0AC147}" type="datetimeFigureOut">
               <a:rPr lang="en-US" smtClean="0"/>
-              <a:t>4/25/2021</a:t>
+              <a:t>6/9/2021</a:t>
             </a:fld>
             <a:endParaRPr lang="en-US"/>
           </a:p>
@@ -1826,7 +1831,7 @@
           <a:p>
             <a:fld id="{FF84B8EE-2D36-44C5-957C-6F2F1F0AC147}" type="datetimeFigureOut">
               <a:rPr lang="en-US" smtClean="0"/>
-              <a:t>4/25/2021</a:t>
+              <a:t>6/9/2021</a:t>
             </a:fld>
             <a:endParaRPr lang="en-US"/>
           </a:p>
@@ -1967,7 +1972,7 @@
           <a:p>
             <a:fld id="{FF84B8EE-2D36-44C5-957C-6F2F1F0AC147}" type="datetimeFigureOut">
               <a:rPr lang="en-US" smtClean="0"/>
-              <a:t>4/25/2021</a:t>
+              <a:t>6/9/2021</a:t>
             </a:fld>
             <a:endParaRPr lang="en-US"/>
           </a:p>
@@ -2080,7 +2085,7 @@
           <a:p>
             <a:fld id="{FF84B8EE-2D36-44C5-957C-6F2F1F0AC147}" type="datetimeFigureOut">
               <a:rPr lang="en-US" smtClean="0"/>
-              <a:t>4/25/2021</a:t>
+              <a:t>6/9/2021</a:t>
             </a:fld>
             <a:endParaRPr lang="en-US"/>
           </a:p>
@@ -2391,7 +2396,7 @@
           <a:p>
             <a:fld id="{FF84B8EE-2D36-44C5-957C-6F2F1F0AC147}" type="datetimeFigureOut">
               <a:rPr lang="en-US" smtClean="0"/>
-              <a:t>4/25/2021</a:t>
+              <a:t>6/9/2021</a:t>
             </a:fld>
             <a:endParaRPr lang="en-US"/>
           </a:p>
@@ -2679,7 +2684,7 @@
           <a:p>
             <a:fld id="{FF84B8EE-2D36-44C5-957C-6F2F1F0AC147}" type="datetimeFigureOut">
               <a:rPr lang="en-US" smtClean="0"/>
-              <a:t>4/25/2021</a:t>
+              <a:t>6/9/2021</a:t>
             </a:fld>
             <a:endParaRPr lang="en-US"/>
           </a:p>
@@ -2920,7 +2925,7 @@
           <a:p>
             <a:fld id="{FF84B8EE-2D36-44C5-957C-6F2F1F0AC147}" type="datetimeFigureOut">
               <a:rPr lang="en-US" smtClean="0"/>
-              <a:t>4/25/2021</a:t>
+              <a:t>6/9/2021</a:t>
             </a:fld>
             <a:endParaRPr lang="en-US"/>
           </a:p>
@@ -4381,8 +4386,8 @@
           </a:graphicData>
         </a:graphic>
       </p:graphicFrame>
-      <mc:AlternateContent xmlns:mc="http://schemas.openxmlformats.org/markup-compatibility/2006">
-        <mc:Choice xmlns:a14="http://schemas.microsoft.com/office/drawing/2010/main" Requires="a14">
+      <mc:AlternateContent xmlns:mc="http://schemas.openxmlformats.org/markup-compatibility/2006" xmlns:a14="http://schemas.microsoft.com/office/drawing/2010/main">
+        <mc:Choice Requires="a14">
           <p:sp>
             <p:nvSpPr>
               <p:cNvPr id="8" name="TextBox 7">
@@ -4411,6 +4416,7 @@
               </a:bodyPr>
               <a:lstStyle/>
               <a:p>
+                <a:pPr/>
                 <a14:m>
                   <m:oMathPara xmlns:m="http://schemas.openxmlformats.org/officeDocument/2006/math">
                     <m:oMathParaPr>
@@ -4530,7 +4536,7 @@
             </p:txBody>
           </p:sp>
         </mc:Choice>
-        <mc:Fallback>
+        <mc:Fallback xmlns="">
           <p:sp>
             <p:nvSpPr>
               <p:cNvPr id="8" name="TextBox 7">
@@ -9099,7 +9105,7 @@
           <a:p>
             <a:r>
               <a:rPr lang="en-US" dirty="0"/>
-              <a:t>Time &lt; 8 hours. Overnight run. </a:t>
+              <a:t>Time to run ~ 8 hours. </a:t>
             </a:r>
           </a:p>
           <a:p>
@@ -9673,8 +9679,8 @@
           </a:graphicData>
         </a:graphic>
       </p:graphicFrame>
-      <mc:AlternateContent xmlns:mc="http://schemas.openxmlformats.org/markup-compatibility/2006">
-        <mc:Choice xmlns:a14="http://schemas.microsoft.com/office/drawing/2010/main" Requires="a14">
+      <mc:AlternateContent xmlns:mc="http://schemas.openxmlformats.org/markup-compatibility/2006" xmlns:a14="http://schemas.microsoft.com/office/drawing/2010/main">
+        <mc:Choice Requires="a14">
           <p:sp>
             <p:nvSpPr>
               <p:cNvPr id="7" name="TextBox 6">
@@ -9703,6 +9709,7 @@
               </a:bodyPr>
               <a:lstStyle/>
               <a:p>
+                <a:pPr/>
                 <a14:m>
                   <m:oMathPara xmlns:m="http://schemas.openxmlformats.org/officeDocument/2006/math">
                     <m:oMathParaPr>
@@ -9788,7 +9795,7 @@
             </p:txBody>
           </p:sp>
         </mc:Choice>
-        <mc:Fallback>
+        <mc:Fallback xmlns="">
           <p:sp>
             <p:nvSpPr>
               <p:cNvPr id="7" name="TextBox 6">

</xml_diff>